<commit_message>
Lecture 08 typo fix
</commit_message>
<xml_diff>
--- a/2024/lecture_08.pptx
+++ b/2024/lecture_08.pptx
@@ -5094,7 +5094,7 @@
                         <m:rPr>
                           <m:sty m:val="p"/>
                         </m:rPr>
-                        <m:t>−</m:t>
+                        <m:t>+</m:t>
                       </m:r>
                       <m:sSub>
                         <m:e>
@@ -11047,7 +11047,7 @@
 </p:sld>
 </file>
 
-<file path=ppt/slides/slide9.xml><?xml version="1.0" encoding="UTF-8"?><p:sld xmlns:a="http://schemas.openxmlformats.org/drawingml/2006/main" xmlns:r="http://schemas.openxmlformats.org/officeDocument/2006/relationships" xmlns:p="http://schemas.openxmlformats.org/presentationml/2006/main"><p:cSld><p:spTree><p:nvGrpSpPr><p:cNvPr id="1" name="" /><p:cNvGrpSpPr /><p:nvPr /></p:nvGrpSpPr><p:grpSpPr><a:xfrm><a:off x="0" y="0" /><a:ext cx="0" cy="0" /><a:chOff x="0" y="0" /><a:chExt cx="0" cy="0" /></a:xfrm></p:grpSpPr><p:sp><p:nvSpPr><p:cNvPr id="2" name="Title 1" /><p:cNvSpPr><a:spLocks noGrp="1" /></p:cNvSpPr><p:nvPr><p:ph type="title" /></p:nvPr></p:nvSpPr><p:spPr><a:xfrm><a:off x="457201" y="204787" /><a:ext cx="3008313" cy="871538" /></a:xfrm></p:spPr><p:txBody><a:bodyPr /><a:lstStyle /><a:p><a:pPr lvl="0" indent="0" marL="0"><a:buNone /></a:pPr><a:r><a:rPr /><a:t>The Linear Model Equation</a:t></a:r></a:p></p:txBody></p:sp><mc:AlternateContent xmlns:mc="http://schemas.openxmlformats.org/markup-compatibility/2006"><mc:Choice xmlns:a14="http://schemas.microsoft.com/office/drawing/2010/main" Requires="a14"><p:sp><p:nvSpPr><p:cNvPr id="4" name="Text Placeholder 3" /><p:cNvSpPr><a:spLocks noGrp="1" /></p:cNvSpPr><p:nvPr><p:ph idx="2" sz="half" type="body" /></p:nvPr></p:nvSpPr><p:spPr /><p:txBody><a:bodyPr /><a:lstStyle /><a:p><a:pPr lvl="0" indent="0" marL="0"><a:buNone /></a:pPr><a14:m><m:oMathPara xmlns:m="http://schemas.openxmlformats.org/officeDocument/2006/math"><m:oMathParaPr><m:jc m:val="center" /></m:oMathParaPr><m:oMath><m:sSub><m:e><m:r><m:t>y</m:t></m:r></m:e><m:sub><m:r><m:t>i</m:t></m:r></m:sub></m:sSub><m:r><m:rPr><m:sty m:val="p" /></m:rPr><m:t>=</m:t></m:r><m:sSub><m:e><m:r><m:t>b</m:t></m:r></m:e><m:sub><m:r><m:t>0</m:t></m:r></m:sub></m:sSub><m:r><m:rPr><m:sty m:val="p" /></m:rPr><m:t>+</m:t></m:r><m:sSub><m:e><m:r><m:t>b</m:t></m:r></m:e><m:sub><m:r><m:t>1</m:t></m:r></m:sub></m:sSub><m:r><m:rPr><m:sty m:val="p" /></m:rPr><m:t>×</m:t></m:r><m:sSub><m:e><m:r><m:t>x</m:t></m:r></m:e><m:sub><m:r><m:t>1</m:t></m:r><m:r><m:t>i</m:t></m:r></m:sub></m:sSub><m:r><m:rPr><m:sty m:val="p" /></m:rPr><m:t>+</m:t></m:r><m:sSub><m:e><m:r><m:t>e</m:t></m:r></m:e><m:sub><m:r><m:t>i</m:t></m:r></m:sub></m:sSub></m:oMath></m:oMathPara></a14:m></a:p></p:txBody></p:sp></mc:Choice></mc:AlternateContent><p:graphicFrame><p:nvGraphicFramePr><p:cNvPr id="6" name="Content Placeholder 5" /><p:cNvGraphicFramePr><a:graphicFrameLocks noGrp="1" /></p:cNvGraphicFramePr><p:nvPr><p:ph idx="1" /></p:nvPr></p:nvGraphicFramePr><p:xfrm><a:off x="3568700" y="203200" /><a:ext cx="5105400" cy="4381500" /></p:xfrm><a:graphic><a:graphicData uri="http://schemas.openxmlformats.org/drawingml/2006/table"><a:tbl><a:tblPr firstRow="0" bandRow="1"><a:tableStyleId>{5C22544A-7EE6-4342-B048-85BDC9FD1C3A}</a:tableStyleId></a:tblPr><a:tblGrid><a:gridCol w="2552700" /><a:gridCol w="2552700" /></a:tblGrid><a:tr h="0"><a:tc><a:txBody><a:bodyPr /><a:lstStyle /><a:p><a:pPr lvl="0" indent="0" marL="0"><a:buNone /></a:pPr><a:r><a:rPr b="1" /><a:t>Term</a:t></a:r></a:p></a:txBody></a:tc><a:tc><a:txBody><a:bodyPr /><a:lstStyle /><a:p><a:pPr lvl="0" indent="0" marL="0"><a:buNone /></a:pPr><a:r><a:rPr b="1" /><a:t>Meaning</a:t></a:r></a:p></a:txBody></a:tc></a:tr><a:tr h="0"><a:tc><a:txBody><a:bodyPr /><a:lstStyle /><a:p><a:pPr lvl="0" indent="0" marL="0"><a:buNone /></a:pPr><a14:m><m:oMath xmlns:m="http://schemas.openxmlformats.org/officeDocument/2006/math"><m:sSub><m:e><m:r><m:t>y</m:t></m:r></m:e><m:sub><m:r><m:t>i</m:t></m:r></m:sub></m:sSub></m:oMath></a14:m><a:r><a:rPr /><a:t> =</a:t></a:r></a:p></a:txBody></a:tc><a:tc><a:txBody><a:bodyPr /><a:lstStyle /><a:p><a:pPr lvl="0" indent="0" marL="0"><a:buNone /></a:pPr><a:r><a:rPr /><a:t>the outcome (</a:t></a:r><a14:m><m:oMath xmlns:m="http://schemas.openxmlformats.org/officeDocument/2006/math"><m:r><m:t>y</m:t></m:r></m:oMath></a14:m><a:r><a:rPr /><a:t>) is equal to (or, is predicted by) an individual’s actual score (</a:t></a:r><a14:m><m:oMath xmlns:m="http://schemas.openxmlformats.org/officeDocument/2006/math"><m:r><m:t>i</m:t></m:r></m:oMath></a14:m><a:r><a:rPr /><a:t>)</a:t></a:r></a:p></a:txBody></a:tc></a:tr><a:tr h="0"><a:tc><a:txBody><a:bodyPr /><a:lstStyle /><a:p><a:pPr lvl="0" indent="0" marL="0"><a:buNone /></a:pPr><a14:m><m:oMath xmlns:m="http://schemas.openxmlformats.org/officeDocument/2006/math"><m:sSub><m:e><m:r><m:t>b</m:t></m:r></m:e><m:sub><m:r><m:t>0</m:t></m:r></m:sub></m:sSub></m:oMath></a14:m></a:p></a:txBody></a:tc><a:tc><a:txBody><a:bodyPr /><a:lstStyle /><a:p><a:pPr lvl="0" indent="0" marL="0"><a:buNone /></a:pPr><a:r><a:rPr /><a:t>the value of beta-zero (the model’s intercept)</a:t></a:r></a:p></a:txBody></a:tc></a:tr><a:tr h="0"><a:tc><a:txBody><a:bodyPr /><a:lstStyle /><a:p><a:pPr lvl="0" indent="0" marL="0"><a:buNone /></a:pPr><a:r><a:rPr /><a:t>+</a:t></a:r></a:p></a:txBody></a:tc><a:tc><a:txBody><a:bodyPr /><a:lstStyle /><a:p><a:pPr lvl="0" indent="0" marL="0"><a:buNone /></a:pPr><a:r><a:rPr /><a:t>plus</a:t></a:r></a:p></a:txBody></a:tc></a:tr><a:tr h="0"><a:tc><a:txBody><a:bodyPr /><a:lstStyle /><a:p><a:pPr lvl="0" indent="0" marL="0"><a:buNone /></a:pPr><a14:m><m:oMath xmlns:m="http://schemas.openxmlformats.org/officeDocument/2006/math"><m:sSub><m:e><m:r><m:t>b</m:t></m:r></m:e><m:sub><m:r><m:t>1</m:t></m:r></m:sub></m:sSub></m:oMath></a14:m></a:p></a:txBody></a:tc><a:tc><a:txBody><a:bodyPr /><a:lstStyle /><a:p><a:pPr lvl="0" indent="0" marL="0"><a:buNone /></a:pPr><a:r><a:rPr /><a:t>the value of beta-one (the model’s slope)</a:t></a:r></a:p></a:txBody></a:tc></a:tr><a:tr h="0"><a:tc><a:txBody><a:bodyPr /><a:lstStyle /><a:p><a:pPr lvl="0" indent="0" marL="0"><a:buNone /></a:pPr><a14:m><m:oMath xmlns:m="http://schemas.openxmlformats.org/officeDocument/2006/math"><m:r><m:rPr><m:sty m:val="p" /></m:rPr><m:t>×</m:t></m:r></m:oMath></a14:m></a:p></a:txBody></a:tc><a:tc><a:txBody><a:bodyPr /><a:lstStyle /><a:p><a:pPr lvl="0" indent="0" marL="0"><a:buNone /></a:pPr><a:r><a:rPr /><a:t>multiplied by</a:t></a:r></a:p></a:txBody></a:tc></a:tr><a:tr h="0"><a:tc><a:txBody><a:bodyPr /><a:lstStyle /><a:p><a:pPr lvl="0" indent="0" marL="0"><a:buNone /></a:pPr><a14:m><m:oMath xmlns:m="http://schemas.openxmlformats.org/officeDocument/2006/math"><m:sSub><m:e><m:r><m:t>x</m:t></m:r></m:e><m:sub><m:r><m:t>1</m:t></m:r><m:r><m:t>i</m:t></m:r></m:sub></m:sSub></m:oMath></a14:m></a:p></a:txBody></a:tc><a:tc><a:txBody><a:bodyPr /><a:lstStyle /><a:p><a:pPr lvl="0" indent="0" marL="0"><a:buNone /></a:pPr><a:r><a:rPr /><a:t>the value of the predictor (</a:t></a:r><a14:m><m:oMath xmlns:m="http://schemas.openxmlformats.org/officeDocument/2006/math"><m:sSub><m:e><m:r><m:t>x</m:t></m:r></m:e><m:sub><m:r><m:t>1</m:t></m:r></m:sub></m:sSub></m:oMath></a14:m><a:r><a:rPr /><a:t>) for an individual’s actual score (</a:t></a:r><a14:m><m:oMath xmlns:m="http://schemas.openxmlformats.org/officeDocument/2006/math"><m:r><m:t>i</m:t></m:r></m:oMath></a14:m><a:r><a:rPr /><a:t>)</a:t></a:r></a:p></a:txBody></a:tc></a:tr><a:tr h="0"><a:tc><a:txBody><a:bodyPr /><a:lstStyle /><a:p><a:pPr lvl="0" indent="0" marL="0"><a:buNone /></a:pPr><a14:m><m:oMath xmlns:m="http://schemas.openxmlformats.org/officeDocument/2006/math"><m:r><m:rPr><m:sty m:val="p" /></m:rPr><m:t>+</m:t></m:r></m:oMath></a14:m></a:p></a:txBody></a:tc><a:tc><a:txBody><a:bodyPr /><a:lstStyle /><a:p><a:pPr lvl="0" indent="0" marL="0"><a:buNone /></a:pPr><a:r><a:rPr /><a:t>plus</a:t></a:r></a:p></a:txBody></a:tc></a:tr><a:tr h="0"><a:tc><a:txBody><a:bodyPr /><a:lstStyle /><a:p><a:pPr lvl="0" indent="0" marL="0"><a:buNone /></a:pPr><a14:m><m:oMath xmlns:m="http://schemas.openxmlformats.org/officeDocument/2006/math"><m:sSub><m:e><m:r><m:t>e</m:t></m:r></m:e><m:sub><m:r><m:t>i</m:t></m:r></m:sub></m:sSub></m:oMath></a14:m></a:p></a:txBody></a:tc><a:tc><a:txBody><a:bodyPr /><a:lstStyle /><a:p><a:pPr lvl="0" indent="0" marL="0"><a:buNone /></a:pPr><a:r><a:rPr /><a:t>the error (</a:t></a:r><a14:m><m:oMath xmlns:m="http://schemas.openxmlformats.org/officeDocument/2006/math"><m:r><m:t>e</m:t></m:r></m:oMath></a14:m><a:r><a:rPr /><a:t>) for the individual’s actual score (</a:t></a:r><a14:m><m:oMath xmlns:m="http://schemas.openxmlformats.org/officeDocument/2006/math"><m:r><m:t>i</m:t></m:r></m:oMath></a14:m><a:r><a:rPr /><a:t>)</a:t></a:r></a:p></a:txBody></a:tc></a:tr></a:tbl></a:graphicData></a:graphic></p:graphicFrame></p:spTree></p:cSld></p:sld>
+<file path=ppt/slides/slide9.xml><?xml version="1.0" encoding="UTF-8"?><p:sld xmlns:a="http://schemas.openxmlformats.org/drawingml/2006/main" xmlns:r="http://schemas.openxmlformats.org/officeDocument/2006/relationships" xmlns:p="http://schemas.openxmlformats.org/presentationml/2006/main"><p:cSld><p:spTree><p:nvGrpSpPr><p:cNvPr id="1" name="" /><p:cNvGrpSpPr /><p:nvPr /></p:nvGrpSpPr><p:grpSpPr><a:xfrm><a:off x="0" y="0" /><a:ext cx="0" cy="0" /><a:chOff x="0" y="0" /><a:chExt cx="0" cy="0" /></a:xfrm></p:grpSpPr><p:sp><p:nvSpPr><p:cNvPr id="2" name="Title 1" /><p:cNvSpPr><a:spLocks noGrp="1" /></p:cNvSpPr><p:nvPr><p:ph type="title" /></p:nvPr></p:nvSpPr><p:spPr><a:xfrm><a:off x="457201" y="204787" /><a:ext cx="3008313" cy="871538" /></a:xfrm></p:spPr><p:txBody><a:bodyPr /><a:lstStyle /><a:p><a:pPr lvl="0" indent="0" marL="0"><a:buNone /></a:pPr><a:r><a:rPr /><a:t>The Linear Model Equation</a:t></a:r></a:p></p:txBody></p:sp><mc:AlternateContent xmlns:mc="http://schemas.openxmlformats.org/markup-compatibility/2006"><mc:Choice xmlns:a14="http://schemas.microsoft.com/office/drawing/2010/main" Requires="a14"><p:sp><p:nvSpPr><p:cNvPr id="4" name="Text Placeholder 3" /><p:cNvSpPr><a:spLocks noGrp="1" /></p:cNvSpPr><p:nvPr><p:ph idx="2" sz="half" type="body" /></p:nvPr></p:nvSpPr><p:spPr /><p:txBody><a:bodyPr /><a:lstStyle /><a:p><a:pPr lvl="0" indent="0" marL="0"><a:buNone /></a:pPr><a14:m><m:oMathPara xmlns:m="http://schemas.openxmlformats.org/officeDocument/2006/math"><m:oMathParaPr><m:jc m:val="center" /></m:oMathParaPr><m:oMath><m:sSub><m:e><m:r><m:t>y</m:t></m:r></m:e><m:sub><m:r><m:t>i</m:t></m:r></m:sub></m:sSub><m:r><m:rPr><m:sty m:val="p" /></m:rPr><m:t>=</m:t></m:r><m:sSub><m:e><m:r><m:t>b</m:t></m:r></m:e><m:sub><m:r><m:t>0</m:t></m:r></m:sub></m:sSub><m:r><m:rPr><m:sty m:val="p" /></m:rPr><m:t>+</m:t></m:r><m:sSub><m:e><m:r><m:t>b</m:t></m:r></m:e><m:sub><m:r><m:t>1</m:t></m:r></m:sub></m:sSub><m:r><m:rPr><m:sty m:val="p" /></m:rPr><m:t>×</m:t></m:r><m:sSub><m:e><m:r><m:t>x</m:t></m:r></m:e><m:sub><m:r><m:t>1</m:t></m:r><m:r><m:t>i</m:t></m:r></m:sub></m:sSub><m:r><m:rPr><m:sty m:val="p" /></m:rPr><m:t>+</m:t></m:r><m:sSub><m:e><m:r><m:t>e</m:t></m:r></m:e><m:sub><m:r><m:t>i</m:t></m:r></m:sub></m:sSub></m:oMath></m:oMathPara></a14:m></a:p></p:txBody></p:sp></mc:Choice></mc:AlternateContent><p:graphicFrame><p:nvGraphicFramePr><p:cNvPr id="6" name="Content Placeholder 5" /><p:cNvGraphicFramePr><a:graphicFrameLocks noGrp="1" /></p:cNvGraphicFramePr><p:nvPr><p:ph idx="1" /></p:nvPr></p:nvGraphicFramePr><p:xfrm><a:off x="3568700" y="203200" /><a:ext cx="5105400" cy="4381500" /></p:xfrm><a:graphic><a:graphicData uri="http://schemas.openxmlformats.org/drawingml/2006/table"><a:tbl><a:tblPr firstRow="0" bandRow="1"><a:tableStyleId>{5C22544A-7EE6-4342-B048-85BDC9FD1C3A}</a:tableStyleId></a:tblPr><a:tblGrid><a:gridCol w="2552700" /><a:gridCol w="2552700" /></a:tblGrid><a:tr h="0"><a:tc><a:txBody><a:bodyPr /><a:lstStyle /><a:p><a:pPr lvl="0" indent="0" marL="0"><a:buNone /></a:pPr><a:r><a:rPr b="1" /><a:t>Term</a:t></a:r></a:p></a:txBody></a:tc><a:tc><a:txBody><a:bodyPr /><a:lstStyle /><a:p><a:pPr lvl="0" indent="0" marL="0"><a:buNone /></a:pPr><a:r><a:rPr b="1" /><a:t>Meaning</a:t></a:r></a:p></a:txBody></a:tc></a:tr><a:tr h="0"><a:tc><a:txBody><a:bodyPr /><a:lstStyle /><a:p><a:pPr lvl="0" indent="0" marL="0"><a:buNone /></a:pPr><a14:m><m:oMath xmlns:m="http://schemas.openxmlformats.org/officeDocument/2006/math"><m:sSub><m:e><m:r><m:t>y</m:t></m:r></m:e><m:sub><m:r><m:t>i</m:t></m:r></m:sub></m:sSub></m:oMath></a14:m><a:r><a:rPr /><a:t> =</a:t></a:r></a:p></a:txBody></a:tc><a:tc><a:txBody><a:bodyPr /><a:lstStyle /><a:p><a:pPr lvl="0" indent="0" marL="0"><a:buNone /></a:pPr><a:r><a:rPr /><a:t>The outcome (</a:t></a:r><a14:m><m:oMath xmlns:m="http://schemas.openxmlformats.org/officeDocument/2006/math"><m:r><m:t>y</m:t></m:r></m:oMath></a14:m><a:r><a:rPr /><a:t>) for an individual’s actual score (</a:t></a:r><a14:m><m:oMath xmlns:m="http://schemas.openxmlformats.org/officeDocument/2006/math"><m:r><m:t>i</m:t></m:r></m:oMath></a14:m><a:r><a:rPr /><a:t>) is equal to (or, is predicted by)…</a:t></a:r></a:p></a:txBody></a:tc></a:tr><a:tr h="0"><a:tc><a:txBody><a:bodyPr /><a:lstStyle /><a:p><a:pPr lvl="0" indent="0" marL="0"><a:buNone /></a:pPr><a14:m><m:oMath xmlns:m="http://schemas.openxmlformats.org/officeDocument/2006/math"><m:sSub><m:e><m:r><m:t>b</m:t></m:r></m:e><m:sub><m:r><m:t>0</m:t></m:r></m:sub></m:sSub></m:oMath></a14:m></a:p></a:txBody></a:tc><a:tc><a:txBody><a:bodyPr /><a:lstStyle /><a:p><a:pPr lvl="0" indent="0" marL="0"><a:buNone /></a:pPr><a:r><a:rPr /><a:t>… the value of beta-zero (the model’s intercept)…</a:t></a:r></a:p></a:txBody></a:tc></a:tr><a:tr h="0"><a:tc><a:txBody><a:bodyPr /><a:lstStyle /><a:p><a:pPr lvl="0" indent="0" marL="0"><a:buNone /></a:pPr><a:r><a:rPr /><a:t>+</a:t></a:r></a:p></a:txBody></a:tc><a:tc><a:txBody><a:bodyPr /><a:lstStyle /><a:p><a:pPr lvl="0" indent="0" marL="0"><a:buNone /></a:pPr><a:r><a:rPr /><a:t>… plus…</a:t></a:r></a:p></a:txBody></a:tc></a:tr><a:tr h="0"><a:tc><a:txBody><a:bodyPr /><a:lstStyle /><a:p><a:pPr lvl="0" indent="0" marL="0"><a:buNone /></a:pPr><a14:m><m:oMath xmlns:m="http://schemas.openxmlformats.org/officeDocument/2006/math"><m:sSub><m:e><m:r><m:t>b</m:t></m:r></m:e><m:sub><m:r><m:t>1</m:t></m:r></m:sub></m:sSub></m:oMath></a14:m></a:p></a:txBody></a:tc><a:tc><a:txBody><a:bodyPr /><a:lstStyle /><a:p><a:pPr lvl="0" indent="0" marL="0"><a:buNone /></a:pPr><a:r><a:rPr /><a:t>… the value of beta-one (the model’s slope)…</a:t></a:r></a:p></a:txBody></a:tc></a:tr><a:tr h="0"><a:tc><a:txBody><a:bodyPr /><a:lstStyle /><a:p><a:pPr lvl="0" indent="0" marL="0"><a:buNone /></a:pPr><a14:m><m:oMath xmlns:m="http://schemas.openxmlformats.org/officeDocument/2006/math"><m:r><m:rPr><m:sty m:val="p" /></m:rPr><m:t>×</m:t></m:r></m:oMath></a14:m></a:p></a:txBody></a:tc><a:tc><a:txBody><a:bodyPr /><a:lstStyle /><a:p><a:pPr lvl="0" indent="0" marL="0"><a:buNone /></a:pPr><a:r><a:rPr /><a:t>… multiplied by…</a:t></a:r></a:p></a:txBody></a:tc></a:tr><a:tr h="0"><a:tc><a:txBody><a:bodyPr /><a:lstStyle /><a:p><a:pPr lvl="0" indent="0" marL="0"><a:buNone /></a:pPr><a14:m><m:oMath xmlns:m="http://schemas.openxmlformats.org/officeDocument/2006/math"><m:sSub><m:e><m:r><m:t>x</m:t></m:r></m:e><m:sub><m:r><m:t>1</m:t></m:r><m:r><m:t>i</m:t></m:r></m:sub></m:sSub></m:oMath></a14:m></a:p></a:txBody></a:tc><a:tc><a:txBody><a:bodyPr /><a:lstStyle /><a:p><a:pPr lvl="0" indent="0" marL="0"><a:buNone /></a:pPr><a:r><a:rPr /><a:t>… the value of the predictor (</a:t></a:r><a14:m><m:oMath xmlns:m="http://schemas.openxmlformats.org/officeDocument/2006/math"><m:sSub><m:e><m:r><m:t>x</m:t></m:r></m:e><m:sub><m:r><m:t>1</m:t></m:r></m:sub></m:sSub></m:oMath></a14:m><a:r><a:rPr /><a:t>) for an individual’s actual score (</a:t></a:r><a14:m><m:oMath xmlns:m="http://schemas.openxmlformats.org/officeDocument/2006/math"><m:r><m:t>i</m:t></m:r></m:oMath></a14:m><a:r><a:rPr /><a:t>)…</a:t></a:r></a:p></a:txBody></a:tc></a:tr><a:tr h="0"><a:tc><a:txBody><a:bodyPr /><a:lstStyle /><a:p><a:pPr lvl="0" indent="0" marL="0"><a:buNone /></a:pPr><a14:m><m:oMath xmlns:m="http://schemas.openxmlformats.org/officeDocument/2006/math"><m:r><m:rPr><m:sty m:val="p" /></m:rPr><m:t>+</m:t></m:r></m:oMath></a14:m></a:p></a:txBody></a:tc><a:tc><a:txBody><a:bodyPr /><a:lstStyle /><a:p><a:pPr lvl="0" indent="0" marL="0"><a:buNone /></a:pPr><a:r><a:rPr /><a:t>… plus…</a:t></a:r></a:p></a:txBody></a:tc></a:tr><a:tr h="0"><a:tc><a:txBody><a:bodyPr /><a:lstStyle /><a:p><a:pPr lvl="0" indent="0" marL="0"><a:buNone /></a:pPr><a14:m><m:oMath xmlns:m="http://schemas.openxmlformats.org/officeDocument/2006/math"><m:sSub><m:e><m:r><m:t>e</m:t></m:r></m:e><m:sub><m:r><m:t>i</m:t></m:r></m:sub></m:sSub></m:oMath></a14:m></a:p></a:txBody></a:tc><a:tc><a:txBody><a:bodyPr /><a:lstStyle /><a:p><a:pPr lvl="0" indent="0" marL="0"><a:buNone /></a:pPr><a:r><a:rPr /><a:t>… the error (</a:t></a:r><a14:m><m:oMath xmlns:m="http://schemas.openxmlformats.org/officeDocument/2006/math"><m:r><m:t>e</m:t></m:r></m:oMath></a14:m><a:r><a:rPr /><a:t>) for the individual’s actual score (</a:t></a:r><a14:m><m:oMath xmlns:m="http://schemas.openxmlformats.org/officeDocument/2006/math"><m:r><m:t>i</m:t></m:r></m:oMath></a14:m><a:r><a:rPr /><a:t>)…</a:t></a:r></a:p></a:txBody></a:tc></a:tr></a:tbl></a:graphicData></a:graphic></p:graphicFrame></p:spTree></p:cSld></p:sld>
 </file>
 
 <file path=ppt/theme/theme1.xml><?xml version="1.0" encoding="utf-8"?>

</xml_diff>